<commit_message>
added final report + fix in presentation
</commit_message>
<xml_diff>
--- a/CMPE272_ProjectFinalPresentation.pptx
+++ b/CMPE272_ProjectFinalPresentation.pptx
@@ -5622,7 +5622,7 @@
           <a:p>
             <a:fld id="{E5A8AC73-024D-2E46-8593-E829381E8EB6}" type="datetimeFigureOut">
               <a:rPr lang="en-US" smtClean="0"/>
-              <a:t>5/2/23</a:t>
+              <a:t>5/13/23</a:t>
             </a:fld>
             <a:endParaRPr lang="en-US"/>
           </a:p>
@@ -6120,7 +6120,7 @@
           <a:p>
             <a:fld id="{12241623-A064-4BED-B073-BA4D61433402}" type="datetime1">
               <a:rPr lang="en-US" smtClean="0"/>
-              <a:t>5/2/23</a:t>
+              <a:t>5/13/23</a:t>
             </a:fld>
             <a:endParaRPr lang="en-US" dirty="0"/>
           </a:p>
@@ -6319,7 +6319,7 @@
           <a:p>
             <a:fld id="{6F86ED0C-1DA7-41F0-94CF-6218B1FEDFF1}" type="datetime1">
               <a:rPr lang="en-US" smtClean="0"/>
-              <a:t>5/2/23</a:t>
+              <a:t>5/13/23</a:t>
             </a:fld>
             <a:endParaRPr lang="en-US" dirty="0"/>
           </a:p>
@@ -6529,7 +6529,7 @@
           <a:p>
             <a:fld id="{EECF02AB-6034-4B88-BC5A-7C17CB0EF809}" type="datetime1">
               <a:rPr lang="en-US" smtClean="0"/>
-              <a:t>5/2/23</a:t>
+              <a:t>5/13/23</a:t>
             </a:fld>
             <a:endParaRPr lang="en-US" dirty="0"/>
           </a:p>
@@ -6728,7 +6728,7 @@
           <a:p>
             <a:fld id="{22F3E5F3-28EE-488F-BD53-B744C06C3DEC}" type="datetime1">
               <a:rPr lang="en-US" smtClean="0"/>
-              <a:t>5/2/23</a:t>
+              <a:t>5/13/23</a:t>
             </a:fld>
             <a:endParaRPr lang="en-US" dirty="0"/>
           </a:p>
@@ -7005,7 +7005,7 @@
           <a:p>
             <a:fld id="{E72EB70D-CD01-44DA-83B3-8FEB3383D307}" type="datetime1">
               <a:rPr lang="en-US" smtClean="0"/>
-              <a:t>5/2/23</a:t>
+              <a:t>5/13/23</a:t>
             </a:fld>
             <a:endParaRPr lang="en-US" dirty="0"/>
           </a:p>
@@ -7272,7 +7272,7 @@
           <a:p>
             <a:fld id="{D0158CFD-9357-46BE-A189-D637A67C8730}" type="datetime1">
               <a:rPr lang="en-US" smtClean="0"/>
-              <a:t>5/2/23</a:t>
+              <a:t>5/13/23</a:t>
             </a:fld>
             <a:endParaRPr lang="en-US" dirty="0"/>
           </a:p>
@@ -7686,7 +7686,7 @@
           <a:p>
             <a:fld id="{7B4742EE-B331-4632-BD10-A82FED6B6FC0}" type="datetime1">
               <a:rPr lang="en-US" smtClean="0"/>
-              <a:t>5/2/23</a:t>
+              <a:t>5/13/23</a:t>
             </a:fld>
             <a:endParaRPr lang="en-US" dirty="0"/>
           </a:p>
@@ -7829,7 +7829,7 @@
           <a:p>
             <a:fld id="{451BA835-D13F-49F4-8F11-5D576AC65FAD}" type="datetime1">
               <a:rPr lang="en-US" smtClean="0"/>
-              <a:t>5/2/23</a:t>
+              <a:t>5/13/23</a:t>
             </a:fld>
             <a:endParaRPr lang="en-US" dirty="0"/>
           </a:p>
@@ -7944,7 +7944,7 @@
           <a:p>
             <a:fld id="{ADBD1799-ACB5-4CB2-86A2-5C574F1C8706}" type="datetime1">
               <a:rPr lang="en-US" smtClean="0"/>
-              <a:t>5/2/23</a:t>
+              <a:t>5/13/23</a:t>
             </a:fld>
             <a:endParaRPr lang="en-US" dirty="0"/>
           </a:p>
@@ -8257,7 +8257,7 @@
           <a:p>
             <a:fld id="{ED5DD0D6-7A82-473E-879B-C6ECD6CCCFEC}" type="datetime1">
               <a:rPr lang="en-US" smtClean="0"/>
-              <a:t>5/2/23</a:t>
+              <a:t>5/13/23</a:t>
             </a:fld>
             <a:endParaRPr lang="en-US" dirty="0"/>
           </a:p>
@@ -8547,7 +8547,7 @@
           <a:p>
             <a:fld id="{D4605E03-BC17-41A7-854C-DFAB672737DC}" type="datetime1">
               <a:rPr lang="en-US" smtClean="0"/>
-              <a:t>5/2/23</a:t>
+              <a:t>5/13/23</a:t>
             </a:fld>
             <a:endParaRPr lang="en-US" dirty="0"/>
           </a:p>
@@ -8790,7 +8790,7 @@
           <a:p>
             <a:fld id="{C4408324-A84C-4A45-93B6-78D079CCE772}" type="datetime1">
               <a:rPr lang="en-US" smtClean="0"/>
-              <a:t>5/2/23</a:t>
+              <a:t>5/13/23</a:t>
             </a:fld>
             <a:endParaRPr lang="en-US" dirty="0"/>
           </a:p>
@@ -10865,7 +10865,7 @@
             </a:pPr>
             <a:r>
               <a:rPr lang="en-US" sz="1600" dirty="0"/>
-              <a:t>Java 20.0.1</a:t>
+              <a:t>Java JDK 17</a:t>
             </a:r>
           </a:p>
           <a:p>

</xml_diff>